<commit_message>
Update to week 2 lecture.
</commit_message>
<xml_diff>
--- a/Week 2/Lecture - Week 2.pptx
+++ b/Week 2/Lecture - Week 2.pptx
@@ -5,17 +5,21 @@
     <p:sldMasterId id="2147483648" r:id="rId1"/>
   </p:sldMasterIdLst>
   <p:notesMasterIdLst>
-    <p:notesMasterId r:id="rId10"/>
+    <p:notesMasterId r:id="rId14"/>
   </p:notesMasterIdLst>
   <p:sldIdLst>
     <p:sldId id="256" r:id="rId2"/>
     <p:sldId id="257" r:id="rId3"/>
     <p:sldId id="258" r:id="rId4"/>
-    <p:sldId id="259" r:id="rId5"/>
-    <p:sldId id="260" r:id="rId6"/>
-    <p:sldId id="261" r:id="rId7"/>
+    <p:sldId id="260" r:id="rId5"/>
+    <p:sldId id="264" r:id="rId6"/>
+    <p:sldId id="265" r:id="rId7"/>
     <p:sldId id="262" r:id="rId8"/>
-    <p:sldId id="263" r:id="rId9"/>
+    <p:sldId id="261" r:id="rId9"/>
+    <p:sldId id="259" r:id="rId10"/>
+    <p:sldId id="266" r:id="rId11"/>
+    <p:sldId id="263" r:id="rId12"/>
+    <p:sldId id="267" r:id="rId13"/>
   </p:sldIdLst>
   <p:sldSz cx="12192000" cy="6858000"/>
   <p:notesSz cx="6858000" cy="9144000"/>
@@ -204,7 +208,7 @@
           <a:p>
             <a:fld id="{28448FF8-9BE7-2349-9CDF-C293406FEDF4}" type="datetimeFigureOut">
               <a:rPr lang="en-US" smtClean="0"/>
-              <a:t>9/21/16</a:t>
+              <a:t>9/23/16</a:t>
             </a:fld>
             <a:endParaRPr lang="en-US"/>
           </a:p>
@@ -576,6 +580,835 @@
 </p:notes>
 </file>
 
+<file path=ppt/notesSlides/notesSlide2.xml><?xml version="1.0" encoding="utf-8"?>
+<p:notes xmlns:a="http://schemas.openxmlformats.org/drawingml/2006/main" xmlns:r="http://schemas.openxmlformats.org/officeDocument/2006/relationships" xmlns:p="http://schemas.openxmlformats.org/presentationml/2006/main">
+  <p:cSld>
+    <p:spTree>
+      <p:nvGrpSpPr>
+        <p:cNvPr id="1" name=""/>
+        <p:cNvGrpSpPr/>
+        <p:nvPr/>
+      </p:nvGrpSpPr>
+      <p:grpSpPr>
+        <a:xfrm>
+          <a:off x="0" y="0"/>
+          <a:ext cx="0" cy="0"/>
+          <a:chOff x="0" y="0"/>
+          <a:chExt cx="0" cy="0"/>
+        </a:xfrm>
+      </p:grpSpPr>
+      <p:sp>
+        <p:nvSpPr>
+          <p:cNvPr id="2" name="Slide Image Placeholder 1"/>
+          <p:cNvSpPr>
+            <a:spLocks noGrp="1" noRot="1" noChangeAspect="1"/>
+          </p:cNvSpPr>
+          <p:nvPr>
+            <p:ph type="sldImg"/>
+          </p:nvPr>
+        </p:nvSpPr>
+        <p:spPr/>
+      </p:sp>
+      <p:sp>
+        <p:nvSpPr>
+          <p:cNvPr id="3" name="Notes Placeholder 2"/>
+          <p:cNvSpPr>
+            <a:spLocks noGrp="1"/>
+          </p:cNvSpPr>
+          <p:nvPr>
+            <p:ph type="body" idx="1"/>
+          </p:nvPr>
+        </p:nvSpPr>
+        <p:spPr/>
+        <p:txBody>
+          <a:bodyPr/>
+          <a:lstStyle/>
+          <a:p>
+            <a:pPr marL="0" marR="0" indent="0" algn="l" defTabSz="914400" rtl="0" eaLnBrk="1" fontAlgn="auto" latinLnBrk="0" hangingPunct="1">
+              <a:lnSpc>
+                <a:spcPct val="100000"/>
+              </a:lnSpc>
+              <a:spcBef>
+                <a:spcPts val="0"/>
+              </a:spcBef>
+              <a:spcAft>
+                <a:spcPts val="0"/>
+              </a:spcAft>
+              <a:buClrTx/>
+              <a:buSzTx/>
+              <a:buFontTx/>
+              <a:buNone/>
+              <a:tabLst/>
+              <a:defRPr/>
+            </a:pPr>
+            <a:r>
+              <a:rPr lang="en-US" sz="1200" b="1" i="0" kern="1200" dirty="0" smtClean="0">
+                <a:solidFill>
+                  <a:schemeClr val="tx1"/>
+                </a:solidFill>
+                <a:effectLst/>
+                <a:latin typeface="+mn-lt"/>
+                <a:ea typeface="+mn-ea"/>
+                <a:cs typeface="+mn-cs"/>
+              </a:rPr>
+              <a:t>OWDs </a:t>
+            </a:r>
+            <a:r>
+              <a:rPr lang="en-US" sz="1200" b="0" i="0" kern="1200" dirty="0" smtClean="0">
+                <a:solidFill>
+                  <a:schemeClr val="tx1"/>
+                </a:solidFill>
+                <a:effectLst/>
+                <a:latin typeface="+mn-lt"/>
+                <a:ea typeface="+mn-ea"/>
+                <a:cs typeface="+mn-cs"/>
+              </a:rPr>
+              <a:t>Controls the visibility of records and are baseline access for the records for an </a:t>
+            </a:r>
+            <a:r>
+              <a:rPr lang="en-US" sz="1200" b="0" i="0" kern="1200" dirty="0" err="1" smtClean="0">
+                <a:solidFill>
+                  <a:schemeClr val="tx1"/>
+                </a:solidFill>
+                <a:effectLst/>
+                <a:latin typeface="+mn-lt"/>
+                <a:ea typeface="+mn-ea"/>
+                <a:cs typeface="+mn-cs"/>
+              </a:rPr>
+              <a:t>organisation</a:t>
+            </a:r>
+            <a:r>
+              <a:rPr lang="en-US" sz="1200" b="0" i="0" kern="1200" dirty="0" smtClean="0">
+                <a:solidFill>
+                  <a:schemeClr val="tx1"/>
+                </a:solidFill>
+                <a:effectLst/>
+                <a:latin typeface="+mn-lt"/>
+                <a:ea typeface="+mn-ea"/>
+                <a:cs typeface="+mn-cs"/>
+              </a:rPr>
+              <a:t>. this access </a:t>
+            </a:r>
+            <a:r>
+              <a:rPr lang="en-US" sz="1200" b="0" i="0" kern="1200" dirty="0" err="1" smtClean="0">
+                <a:solidFill>
+                  <a:schemeClr val="tx1"/>
+                </a:solidFill>
+                <a:effectLst/>
+                <a:latin typeface="+mn-lt"/>
+                <a:ea typeface="+mn-ea"/>
+                <a:cs typeface="+mn-cs"/>
+              </a:rPr>
+              <a:t>ican</a:t>
+            </a:r>
+            <a:r>
+              <a:rPr lang="en-US" sz="1200" b="0" i="0" kern="1200" dirty="0" smtClean="0">
+                <a:solidFill>
+                  <a:schemeClr val="tx1"/>
+                </a:solidFill>
+                <a:effectLst/>
+                <a:latin typeface="+mn-lt"/>
+                <a:ea typeface="+mn-ea"/>
+                <a:cs typeface="+mn-cs"/>
+              </a:rPr>
+              <a:t> be opened up using :</a:t>
+            </a:r>
+          </a:p>
+        </p:txBody>
+      </p:sp>
+      <p:sp>
+        <p:nvSpPr>
+          <p:cNvPr id="4" name="Slide Number Placeholder 3"/>
+          <p:cNvSpPr>
+            <a:spLocks noGrp="1"/>
+          </p:cNvSpPr>
+          <p:nvPr>
+            <p:ph type="sldNum" sz="quarter" idx="10"/>
+          </p:nvPr>
+        </p:nvSpPr>
+        <p:spPr/>
+        <p:txBody>
+          <a:bodyPr/>
+          <a:lstStyle/>
+          <a:p>
+            <a:fld id="{2A7ACD87-0BBA-A943-A0BD-F45173EAFA2A}" type="slidenum">
+              <a:rPr lang="en-US" smtClean="0"/>
+              <a:t>6</a:t>
+            </a:fld>
+            <a:endParaRPr lang="en-US"/>
+          </a:p>
+        </p:txBody>
+      </p:sp>
+    </p:spTree>
+    <p:extLst>
+      <p:ext uri="{BB962C8B-B14F-4D97-AF65-F5344CB8AC3E}">
+        <p14:creationId xmlns:p14="http://schemas.microsoft.com/office/powerpoint/2010/main" val="463665916"/>
+      </p:ext>
+    </p:extLst>
+  </p:cSld>
+  <p:clrMapOvr>
+    <a:masterClrMapping/>
+  </p:clrMapOvr>
+</p:notes>
+</file>
+
+<file path=ppt/notesSlides/notesSlide3.xml><?xml version="1.0" encoding="utf-8"?>
+<p:notes xmlns:a="http://schemas.openxmlformats.org/drawingml/2006/main" xmlns:r="http://schemas.openxmlformats.org/officeDocument/2006/relationships" xmlns:p="http://schemas.openxmlformats.org/presentationml/2006/main">
+  <p:cSld>
+    <p:spTree>
+      <p:nvGrpSpPr>
+        <p:cNvPr id="1" name=""/>
+        <p:cNvGrpSpPr/>
+        <p:nvPr/>
+      </p:nvGrpSpPr>
+      <p:grpSpPr>
+        <a:xfrm>
+          <a:off x="0" y="0"/>
+          <a:ext cx="0" cy="0"/>
+          <a:chOff x="0" y="0"/>
+          <a:chExt cx="0" cy="0"/>
+        </a:xfrm>
+      </p:grpSpPr>
+      <p:sp>
+        <p:nvSpPr>
+          <p:cNvPr id="2" name="Slide Image Placeholder 1"/>
+          <p:cNvSpPr>
+            <a:spLocks noGrp="1" noRot="1" noChangeAspect="1"/>
+          </p:cNvSpPr>
+          <p:nvPr>
+            <p:ph type="sldImg"/>
+          </p:nvPr>
+        </p:nvSpPr>
+        <p:spPr/>
+      </p:sp>
+      <p:sp>
+        <p:nvSpPr>
+          <p:cNvPr id="3" name="Notes Placeholder 2"/>
+          <p:cNvSpPr>
+            <a:spLocks noGrp="1"/>
+          </p:cNvSpPr>
+          <p:nvPr>
+            <p:ph type="body" idx="1"/>
+          </p:nvPr>
+        </p:nvSpPr>
+        <p:spPr/>
+        <p:txBody>
+          <a:bodyPr/>
+          <a:lstStyle/>
+          <a:p>
+            <a:pPr marL="0" marR="0" indent="0" algn="l" defTabSz="914400" rtl="0" eaLnBrk="1" fontAlgn="auto" latinLnBrk="0" hangingPunct="1">
+              <a:lnSpc>
+                <a:spcPct val="100000"/>
+              </a:lnSpc>
+              <a:spcBef>
+                <a:spcPts val="0"/>
+              </a:spcBef>
+              <a:spcAft>
+                <a:spcPts val="0"/>
+              </a:spcAft>
+              <a:buClrTx/>
+              <a:buSzTx/>
+              <a:buFontTx/>
+              <a:buNone/>
+              <a:tabLst/>
+              <a:defRPr/>
+            </a:pPr>
+            <a:r>
+              <a:rPr lang="en-US" sz="1200" b="1" i="0" kern="1200" dirty="0" smtClean="0">
+                <a:solidFill>
+                  <a:schemeClr val="tx1"/>
+                </a:solidFill>
+                <a:effectLst/>
+                <a:latin typeface="+mn-lt"/>
+                <a:ea typeface="+mn-ea"/>
+                <a:cs typeface="+mn-cs"/>
+              </a:rPr>
+              <a:t>Manual Sharing </a:t>
+            </a:r>
+            <a:r>
+              <a:rPr lang="en-US" sz="1200" b="0" i="0" kern="1200" dirty="0" smtClean="0">
+                <a:solidFill>
+                  <a:schemeClr val="tx1"/>
+                </a:solidFill>
+                <a:effectLst/>
+                <a:latin typeface="+mn-lt"/>
+                <a:ea typeface="+mn-ea"/>
+                <a:cs typeface="+mn-cs"/>
+              </a:rPr>
+              <a:t>is done when we want to give access on a particular record level</a:t>
+            </a:r>
+          </a:p>
+          <a:p>
+            <a:pPr marL="0" marR="0" indent="0" algn="l" defTabSz="914400" rtl="0" eaLnBrk="1" fontAlgn="auto" latinLnBrk="0" hangingPunct="1">
+              <a:lnSpc>
+                <a:spcPct val="100000"/>
+              </a:lnSpc>
+              <a:spcBef>
+                <a:spcPts val="0"/>
+              </a:spcBef>
+              <a:spcAft>
+                <a:spcPts val="0"/>
+              </a:spcAft>
+              <a:buClrTx/>
+              <a:buSzTx/>
+              <a:buFontTx/>
+              <a:buNone/>
+              <a:tabLst/>
+              <a:defRPr/>
+            </a:pPr>
+            <a:r>
+              <a:rPr lang="en-US" sz="1200" b="1" i="0" kern="1200" dirty="0" smtClean="0">
+                <a:solidFill>
+                  <a:schemeClr val="tx1"/>
+                </a:solidFill>
+                <a:effectLst/>
+                <a:latin typeface="+mn-lt"/>
+                <a:ea typeface="+mn-ea"/>
+                <a:cs typeface="+mn-cs"/>
+              </a:rPr>
+              <a:t>Sharing Rules</a:t>
+            </a:r>
+            <a:r>
+              <a:rPr lang="en-US" sz="1200" b="0" i="0" kern="1200" dirty="0" smtClean="0">
+                <a:solidFill>
+                  <a:schemeClr val="tx1"/>
+                </a:solidFill>
+                <a:effectLst/>
+                <a:latin typeface="+mn-lt"/>
+                <a:ea typeface="+mn-ea"/>
+                <a:cs typeface="+mn-cs"/>
+              </a:rPr>
+              <a:t> are </a:t>
+            </a:r>
+            <a:r>
+              <a:rPr lang="en-US" sz="1200" b="0" i="0" kern="1200" dirty="0" err="1" smtClean="0">
+                <a:solidFill>
+                  <a:schemeClr val="tx1"/>
+                </a:solidFill>
+                <a:effectLst/>
+                <a:latin typeface="+mn-lt"/>
+                <a:ea typeface="+mn-ea"/>
+                <a:cs typeface="+mn-cs"/>
+              </a:rPr>
+              <a:t>creagted</a:t>
+            </a:r>
+            <a:r>
+              <a:rPr lang="en-US" sz="1200" b="0" i="0" kern="1200" dirty="0" smtClean="0">
+                <a:solidFill>
+                  <a:schemeClr val="tx1"/>
+                </a:solidFill>
+                <a:effectLst/>
+                <a:latin typeface="+mn-lt"/>
+                <a:ea typeface="+mn-ea"/>
+                <a:cs typeface="+mn-cs"/>
+              </a:rPr>
+              <a:t> when we want to open the access on an object level.  Sharing can be done within roles, roles &amp; subordinates and </a:t>
+            </a:r>
+            <a:r>
+              <a:rPr lang="en-US" sz="1200" b="1" i="0" kern="1200" dirty="0" smtClean="0">
+                <a:solidFill>
+                  <a:schemeClr val="tx1"/>
+                </a:solidFill>
+                <a:effectLst/>
+                <a:latin typeface="+mn-lt"/>
+                <a:ea typeface="+mn-ea"/>
+                <a:cs typeface="+mn-cs"/>
+              </a:rPr>
+              <a:t>Public groups </a:t>
+            </a:r>
+            <a:r>
+              <a:rPr lang="en-US" sz="1200" b="0" i="0" kern="1200" dirty="0" smtClean="0">
+                <a:solidFill>
+                  <a:schemeClr val="tx1"/>
+                </a:solidFill>
+                <a:effectLst/>
+                <a:latin typeface="+mn-lt"/>
+                <a:ea typeface="+mn-ea"/>
+                <a:cs typeface="+mn-cs"/>
+              </a:rPr>
+              <a:t>(you create public groups to </a:t>
+            </a:r>
+            <a:r>
+              <a:rPr lang="en-US" sz="1200" b="0" i="0" kern="1200" dirty="0" err="1" smtClean="0">
+                <a:solidFill>
+                  <a:schemeClr val="tx1"/>
+                </a:solidFill>
+                <a:effectLst/>
+                <a:latin typeface="+mn-lt"/>
+                <a:ea typeface="+mn-ea"/>
+                <a:cs typeface="+mn-cs"/>
+              </a:rPr>
+              <a:t>minimise</a:t>
+            </a:r>
+            <a:r>
+              <a:rPr lang="en-US" sz="1200" b="0" i="0" kern="1200" dirty="0" smtClean="0">
+                <a:solidFill>
+                  <a:schemeClr val="tx1"/>
+                </a:solidFill>
+                <a:effectLst/>
+                <a:latin typeface="+mn-lt"/>
+                <a:ea typeface="+mn-ea"/>
+                <a:cs typeface="+mn-cs"/>
+              </a:rPr>
+              <a:t> the number of sharing rules e.g. you create a group "</a:t>
+            </a:r>
+            <a:r>
+              <a:rPr lang="en-US" sz="1200" b="0" i="0" kern="1200" dirty="0" err="1" smtClean="0">
+                <a:solidFill>
+                  <a:schemeClr val="tx1"/>
+                </a:solidFill>
+                <a:effectLst/>
+                <a:latin typeface="+mn-lt"/>
+                <a:ea typeface="+mn-ea"/>
+                <a:cs typeface="+mn-cs"/>
+              </a:rPr>
+              <a:t>emea</a:t>
+            </a:r>
+            <a:r>
+              <a:rPr lang="en-US" sz="1200" b="0" i="0" kern="1200" dirty="0" smtClean="0">
+                <a:solidFill>
+                  <a:schemeClr val="tx1"/>
+                </a:solidFill>
+                <a:effectLst/>
+                <a:latin typeface="+mn-lt"/>
+                <a:ea typeface="+mn-ea"/>
+                <a:cs typeface="+mn-cs"/>
+              </a:rPr>
+              <a:t> US" with roles &amp; subordinates or roles </a:t>
+            </a:r>
+            <a:r>
+              <a:rPr lang="en-US" sz="1200" b="0" i="0" kern="1200" dirty="0" err="1" smtClean="0">
+                <a:solidFill>
+                  <a:schemeClr val="tx1"/>
+                </a:solidFill>
+                <a:effectLst/>
+                <a:latin typeface="+mn-lt"/>
+                <a:ea typeface="+mn-ea"/>
+                <a:cs typeface="+mn-cs"/>
+              </a:rPr>
+              <a:t>emea</a:t>
+            </a:r>
+            <a:r>
+              <a:rPr lang="en-US" sz="1200" b="0" i="0" kern="1200" dirty="0" smtClean="0">
+                <a:solidFill>
+                  <a:schemeClr val="tx1"/>
+                </a:solidFill>
+                <a:effectLst/>
+                <a:latin typeface="+mn-lt"/>
+                <a:ea typeface="+mn-ea"/>
+                <a:cs typeface="+mn-cs"/>
+              </a:rPr>
+              <a:t> and us)</a:t>
+            </a:r>
+          </a:p>
+          <a:p>
+            <a:endParaRPr lang="en-US" dirty="0" smtClean="0"/>
+          </a:p>
+        </p:txBody>
+      </p:sp>
+      <p:sp>
+        <p:nvSpPr>
+          <p:cNvPr id="4" name="Slide Number Placeholder 3"/>
+          <p:cNvSpPr>
+            <a:spLocks noGrp="1"/>
+          </p:cNvSpPr>
+          <p:nvPr>
+            <p:ph type="sldNum" sz="quarter" idx="10"/>
+          </p:nvPr>
+        </p:nvSpPr>
+        <p:spPr/>
+        <p:txBody>
+          <a:bodyPr/>
+          <a:lstStyle/>
+          <a:p>
+            <a:fld id="{2A7ACD87-0BBA-A943-A0BD-F45173EAFA2A}" type="slidenum">
+              <a:rPr lang="en-US" smtClean="0"/>
+              <a:t>7</a:t>
+            </a:fld>
+            <a:endParaRPr lang="en-US"/>
+          </a:p>
+        </p:txBody>
+      </p:sp>
+    </p:spTree>
+    <p:extLst>
+      <p:ext uri="{BB962C8B-B14F-4D97-AF65-F5344CB8AC3E}">
+        <p14:creationId xmlns:p14="http://schemas.microsoft.com/office/powerpoint/2010/main" val="313192818"/>
+      </p:ext>
+    </p:extLst>
+  </p:cSld>
+  <p:clrMapOvr>
+    <a:masterClrMapping/>
+  </p:clrMapOvr>
+</p:notes>
+</file>
+
+<file path=ppt/notesSlides/notesSlide4.xml><?xml version="1.0" encoding="utf-8"?>
+<p:notes xmlns:a="http://schemas.openxmlformats.org/drawingml/2006/main" xmlns:r="http://schemas.openxmlformats.org/officeDocument/2006/relationships" xmlns:p="http://schemas.openxmlformats.org/presentationml/2006/main">
+  <p:cSld>
+    <p:spTree>
+      <p:nvGrpSpPr>
+        <p:cNvPr id="1" name=""/>
+        <p:cNvGrpSpPr/>
+        <p:nvPr/>
+      </p:nvGrpSpPr>
+      <p:grpSpPr>
+        <a:xfrm>
+          <a:off x="0" y="0"/>
+          <a:ext cx="0" cy="0"/>
+          <a:chOff x="0" y="0"/>
+          <a:chExt cx="0" cy="0"/>
+        </a:xfrm>
+      </p:grpSpPr>
+      <p:sp>
+        <p:nvSpPr>
+          <p:cNvPr id="2" name="Slide Image Placeholder 1"/>
+          <p:cNvSpPr>
+            <a:spLocks noGrp="1" noRot="1" noChangeAspect="1"/>
+          </p:cNvSpPr>
+          <p:nvPr>
+            <p:ph type="sldImg"/>
+          </p:nvPr>
+        </p:nvSpPr>
+        <p:spPr/>
+      </p:sp>
+      <p:sp>
+        <p:nvSpPr>
+          <p:cNvPr id="3" name="Notes Placeholder 2"/>
+          <p:cNvSpPr>
+            <a:spLocks noGrp="1"/>
+          </p:cNvSpPr>
+          <p:nvPr>
+            <p:ph type="body" idx="1"/>
+          </p:nvPr>
+        </p:nvSpPr>
+        <p:spPr/>
+        <p:txBody>
+          <a:bodyPr/>
+          <a:lstStyle/>
+          <a:p>
+            <a:r>
+              <a:rPr lang="en-US" sz="1200" b="1" i="0" kern="1200" dirty="0" smtClean="0">
+                <a:solidFill>
+                  <a:schemeClr val="tx1"/>
+                </a:solidFill>
+                <a:effectLst/>
+                <a:latin typeface="+mn-lt"/>
+                <a:ea typeface="+mn-ea"/>
+                <a:cs typeface="+mn-cs"/>
+              </a:rPr>
+              <a:t>Roles</a:t>
+            </a:r>
+            <a:r>
+              <a:rPr lang="en-US" sz="1200" b="0" i="0" kern="1200" dirty="0" smtClean="0">
+                <a:solidFill>
+                  <a:schemeClr val="tx1"/>
+                </a:solidFill>
+                <a:effectLst/>
+                <a:latin typeface="+mn-lt"/>
+                <a:ea typeface="+mn-ea"/>
+                <a:cs typeface="+mn-cs"/>
+              </a:rPr>
+              <a:t> in salesforce works differently.  Roles decides what data users can view (e.g. if OWDs are public everyone can view everything but if OWD are private and visibility is restricted, Manager can see the data of their direct reports regardless or the OWD settings.</a:t>
+            </a:r>
+            <a:endParaRPr lang="en-US" sz="1200" b="0" i="0" kern="1200" dirty="0">
+              <a:solidFill>
+                <a:schemeClr val="tx1"/>
+              </a:solidFill>
+              <a:effectLst/>
+              <a:latin typeface="+mn-lt"/>
+              <a:ea typeface="+mn-ea"/>
+              <a:cs typeface="+mn-cs"/>
+            </a:endParaRPr>
+          </a:p>
+        </p:txBody>
+      </p:sp>
+      <p:sp>
+        <p:nvSpPr>
+          <p:cNvPr id="4" name="Slide Number Placeholder 3"/>
+          <p:cNvSpPr>
+            <a:spLocks noGrp="1"/>
+          </p:cNvSpPr>
+          <p:nvPr>
+            <p:ph type="sldNum" sz="quarter" idx="10"/>
+          </p:nvPr>
+        </p:nvSpPr>
+        <p:spPr/>
+        <p:txBody>
+          <a:bodyPr/>
+          <a:lstStyle/>
+          <a:p>
+            <a:fld id="{2A7ACD87-0BBA-A943-A0BD-F45173EAFA2A}" type="slidenum">
+              <a:rPr lang="en-US" smtClean="0"/>
+              <a:t>8</a:t>
+            </a:fld>
+            <a:endParaRPr lang="en-US"/>
+          </a:p>
+        </p:txBody>
+      </p:sp>
+    </p:spTree>
+    <p:extLst>
+      <p:ext uri="{BB962C8B-B14F-4D97-AF65-F5344CB8AC3E}">
+        <p14:creationId xmlns:p14="http://schemas.microsoft.com/office/powerpoint/2010/main" val="629592475"/>
+      </p:ext>
+    </p:extLst>
+  </p:cSld>
+  <p:clrMapOvr>
+    <a:masterClrMapping/>
+  </p:clrMapOvr>
+</p:notes>
+</file>
+
+<file path=ppt/notesSlides/notesSlide5.xml><?xml version="1.0" encoding="utf-8"?>
+<p:notes xmlns:a="http://schemas.openxmlformats.org/drawingml/2006/main" xmlns:r="http://schemas.openxmlformats.org/officeDocument/2006/relationships" xmlns:p="http://schemas.openxmlformats.org/presentationml/2006/main">
+  <p:cSld>
+    <p:spTree>
+      <p:nvGrpSpPr>
+        <p:cNvPr id="1" name=""/>
+        <p:cNvGrpSpPr/>
+        <p:nvPr/>
+      </p:nvGrpSpPr>
+      <p:grpSpPr>
+        <a:xfrm>
+          <a:off x="0" y="0"/>
+          <a:ext cx="0" cy="0"/>
+          <a:chOff x="0" y="0"/>
+          <a:chExt cx="0" cy="0"/>
+        </a:xfrm>
+      </p:grpSpPr>
+      <p:sp>
+        <p:nvSpPr>
+          <p:cNvPr id="2" name="Slide Image Placeholder 1"/>
+          <p:cNvSpPr>
+            <a:spLocks noGrp="1" noRot="1" noChangeAspect="1"/>
+          </p:cNvSpPr>
+          <p:nvPr>
+            <p:ph type="sldImg"/>
+          </p:nvPr>
+        </p:nvSpPr>
+        <p:spPr/>
+      </p:sp>
+      <p:sp>
+        <p:nvSpPr>
+          <p:cNvPr id="3" name="Notes Placeholder 2"/>
+          <p:cNvSpPr>
+            <a:spLocks noGrp="1"/>
+          </p:cNvSpPr>
+          <p:nvPr>
+            <p:ph type="body" idx="1"/>
+          </p:nvPr>
+        </p:nvSpPr>
+        <p:spPr/>
+        <p:txBody>
+          <a:bodyPr/>
+          <a:lstStyle/>
+          <a:p>
+            <a:pPr marL="0" marR="0" indent="0" algn="l" defTabSz="914400" rtl="0" eaLnBrk="1" fontAlgn="auto" latinLnBrk="0" hangingPunct="1">
+              <a:lnSpc>
+                <a:spcPct val="100000"/>
+              </a:lnSpc>
+              <a:spcBef>
+                <a:spcPts val="0"/>
+              </a:spcBef>
+              <a:spcAft>
+                <a:spcPts val="0"/>
+              </a:spcAft>
+              <a:buClrTx/>
+              <a:buSzTx/>
+              <a:buFontTx/>
+              <a:buNone/>
+              <a:tabLst/>
+              <a:defRPr/>
+            </a:pPr>
+            <a:r>
+              <a:rPr lang="en-US" sz="1200" b="1" i="0" kern="1200" dirty="0" smtClean="0">
+                <a:solidFill>
+                  <a:schemeClr val="tx1"/>
+                </a:solidFill>
+                <a:effectLst/>
+                <a:latin typeface="+mn-lt"/>
+                <a:ea typeface="+mn-ea"/>
+                <a:cs typeface="+mn-cs"/>
+              </a:rPr>
+              <a:t>Profiles </a:t>
+            </a:r>
+            <a:r>
+              <a:rPr lang="en-US" sz="1200" b="0" i="0" kern="1200" dirty="0" smtClean="0">
+                <a:solidFill>
+                  <a:schemeClr val="tx1"/>
+                </a:solidFill>
+                <a:effectLst/>
+                <a:latin typeface="+mn-lt"/>
+                <a:ea typeface="+mn-ea"/>
+                <a:cs typeface="+mn-cs"/>
+              </a:rPr>
+              <a:t>determines what user can do with the data they view in terms of apps, tabs, object level permission, field level permission, page layout, record type and wide range of other permissions.</a:t>
+            </a:r>
+          </a:p>
+        </p:txBody>
+      </p:sp>
+      <p:sp>
+        <p:nvSpPr>
+          <p:cNvPr id="4" name="Slide Number Placeholder 3"/>
+          <p:cNvSpPr>
+            <a:spLocks noGrp="1"/>
+          </p:cNvSpPr>
+          <p:nvPr>
+            <p:ph type="sldNum" sz="quarter" idx="10"/>
+          </p:nvPr>
+        </p:nvSpPr>
+        <p:spPr/>
+        <p:txBody>
+          <a:bodyPr/>
+          <a:lstStyle/>
+          <a:p>
+            <a:fld id="{2A7ACD87-0BBA-A943-A0BD-F45173EAFA2A}" type="slidenum">
+              <a:rPr lang="en-US" smtClean="0"/>
+              <a:t>9</a:t>
+            </a:fld>
+            <a:endParaRPr lang="en-US"/>
+          </a:p>
+        </p:txBody>
+      </p:sp>
+    </p:spTree>
+    <p:extLst>
+      <p:ext uri="{BB962C8B-B14F-4D97-AF65-F5344CB8AC3E}">
+        <p14:creationId xmlns:p14="http://schemas.microsoft.com/office/powerpoint/2010/main" val="908798556"/>
+      </p:ext>
+    </p:extLst>
+  </p:cSld>
+  <p:clrMapOvr>
+    <a:masterClrMapping/>
+  </p:clrMapOvr>
+</p:notes>
+</file>
+
+<file path=ppt/notesSlides/notesSlide6.xml><?xml version="1.0" encoding="utf-8"?>
+<p:notes xmlns:a="http://schemas.openxmlformats.org/drawingml/2006/main" xmlns:r="http://schemas.openxmlformats.org/officeDocument/2006/relationships" xmlns:p="http://schemas.openxmlformats.org/presentationml/2006/main">
+  <p:cSld>
+    <p:spTree>
+      <p:nvGrpSpPr>
+        <p:cNvPr id="1" name=""/>
+        <p:cNvGrpSpPr/>
+        <p:nvPr/>
+      </p:nvGrpSpPr>
+      <p:grpSpPr>
+        <a:xfrm>
+          <a:off x="0" y="0"/>
+          <a:ext cx="0" cy="0"/>
+          <a:chOff x="0" y="0"/>
+          <a:chExt cx="0" cy="0"/>
+        </a:xfrm>
+      </p:grpSpPr>
+      <p:sp>
+        <p:nvSpPr>
+          <p:cNvPr id="2" name="Slide Image Placeholder 1"/>
+          <p:cNvSpPr>
+            <a:spLocks noGrp="1" noRot="1" noChangeAspect="1"/>
+          </p:cNvSpPr>
+          <p:nvPr>
+            <p:ph type="sldImg"/>
+          </p:nvPr>
+        </p:nvSpPr>
+        <p:spPr/>
+      </p:sp>
+      <p:sp>
+        <p:nvSpPr>
+          <p:cNvPr id="3" name="Notes Placeholder 2"/>
+          <p:cNvSpPr>
+            <a:spLocks noGrp="1"/>
+          </p:cNvSpPr>
+          <p:nvPr>
+            <p:ph type="body" idx="1"/>
+          </p:nvPr>
+        </p:nvSpPr>
+        <p:spPr/>
+        <p:txBody>
+          <a:bodyPr/>
+          <a:lstStyle/>
+          <a:p>
+            <a:pPr marL="0" marR="0" indent="0" algn="l" defTabSz="914400" rtl="0" eaLnBrk="1" fontAlgn="auto" latinLnBrk="0" hangingPunct="1">
+              <a:lnSpc>
+                <a:spcPct val="100000"/>
+              </a:lnSpc>
+              <a:spcBef>
+                <a:spcPts val="0"/>
+              </a:spcBef>
+              <a:spcAft>
+                <a:spcPts val="0"/>
+              </a:spcAft>
+              <a:buClrTx/>
+              <a:buSzTx/>
+              <a:buFontTx/>
+              <a:buNone/>
+              <a:tabLst/>
+              <a:defRPr/>
+            </a:pPr>
+            <a:r>
+              <a:rPr lang="en-US" sz="1200" b="1" i="0" kern="1200" dirty="0" smtClean="0">
+                <a:solidFill>
+                  <a:schemeClr val="tx1"/>
+                </a:solidFill>
+                <a:effectLst/>
+                <a:latin typeface="+mn-lt"/>
+                <a:ea typeface="+mn-ea"/>
+                <a:cs typeface="+mn-cs"/>
+              </a:rPr>
+              <a:t>Permission Set </a:t>
+            </a:r>
+            <a:r>
+              <a:rPr lang="en-US" sz="1200" b="0" i="0" kern="1200" dirty="0" smtClean="0">
+                <a:solidFill>
+                  <a:schemeClr val="tx1"/>
+                </a:solidFill>
+                <a:effectLst/>
+                <a:latin typeface="+mn-lt"/>
+                <a:ea typeface="+mn-ea"/>
+                <a:cs typeface="+mn-cs"/>
+              </a:rPr>
+              <a:t> is another way of opening access on a user level (it can be done on profile but then we to give access to a or few users and not all the user on the profile)</a:t>
+            </a:r>
+          </a:p>
+          <a:p>
+            <a:endParaRPr lang="en-US" dirty="0"/>
+          </a:p>
+        </p:txBody>
+      </p:sp>
+      <p:sp>
+        <p:nvSpPr>
+          <p:cNvPr id="4" name="Slide Number Placeholder 3"/>
+          <p:cNvSpPr>
+            <a:spLocks noGrp="1"/>
+          </p:cNvSpPr>
+          <p:nvPr>
+            <p:ph type="sldNum" sz="quarter" idx="10"/>
+          </p:nvPr>
+        </p:nvSpPr>
+        <p:spPr/>
+        <p:txBody>
+          <a:bodyPr/>
+          <a:lstStyle/>
+          <a:p>
+            <a:fld id="{2A7ACD87-0BBA-A943-A0BD-F45173EAFA2A}" type="slidenum">
+              <a:rPr lang="en-US" smtClean="0"/>
+              <a:t>10</a:t>
+            </a:fld>
+            <a:endParaRPr lang="en-US"/>
+          </a:p>
+        </p:txBody>
+      </p:sp>
+    </p:spTree>
+    <p:extLst>
+      <p:ext uri="{BB962C8B-B14F-4D97-AF65-F5344CB8AC3E}">
+        <p14:creationId xmlns:p14="http://schemas.microsoft.com/office/powerpoint/2010/main" val="330842194"/>
+      </p:ext>
+    </p:extLst>
+  </p:cSld>
+  <p:clrMapOvr>
+    <a:masterClrMapping/>
+  </p:clrMapOvr>
+</p:notes>
+</file>
+
 <file path=ppt/slideLayouts/slideLayout1.xml><?xml version="1.0" encoding="utf-8"?>
 <p:sldLayout xmlns:a="http://schemas.openxmlformats.org/drawingml/2006/main" xmlns:r="http://schemas.openxmlformats.org/officeDocument/2006/relationships" xmlns:p="http://schemas.openxmlformats.org/presentationml/2006/main" type="title" preserve="1">
   <p:cSld name="Title Slide">
@@ -762,7 +1595,7 @@
           <a:p>
             <a:fld id="{4AAD347D-5ACD-4C99-B74B-A9C85AD731AF}" type="datetimeFigureOut">
               <a:rPr lang="en-US" dirty="0"/>
-              <a:t>9/21/16</a:t>
+              <a:t>9/23/16</a:t>
             </a:fld>
             <a:endParaRPr lang="en-US" dirty="0"/>
           </a:p>
@@ -1032,7 +1865,7 @@
           <a:p>
             <a:fld id="{4509A250-FF31-4206-8172-F9D3106AACB1}" type="datetimeFigureOut">
               <a:rPr lang="en-US" dirty="0"/>
-              <a:t>9/21/16</a:t>
+              <a:t>9/23/16</a:t>
             </a:fld>
             <a:endParaRPr lang="en-US" dirty="0"/>
           </a:p>
@@ -1221,7 +2054,7 @@
           <a:p>
             <a:fld id="{4509A250-FF31-4206-8172-F9D3106AACB1}" type="datetimeFigureOut">
               <a:rPr lang="en-US" dirty="0"/>
-              <a:t>9/21/16</a:t>
+              <a:t>9/23/16</a:t>
             </a:fld>
             <a:endParaRPr lang="en-US" dirty="0"/>
           </a:p>
@@ -1489,7 +2322,7 @@
           <a:p>
             <a:fld id="{4509A250-FF31-4206-8172-F9D3106AACB1}" type="datetimeFigureOut">
               <a:rPr lang="en-US" dirty="0"/>
-              <a:t>9/21/16</a:t>
+              <a:t>9/23/16</a:t>
             </a:fld>
             <a:endParaRPr lang="en-US" dirty="0"/>
           </a:p>
@@ -1825,7 +2658,7 @@
           <a:p>
             <a:fld id="{4509A250-FF31-4206-8172-F9D3106AACB1}" type="datetimeFigureOut">
               <a:rPr lang="en-US" dirty="0"/>
-              <a:t>9/21/16</a:t>
+              <a:t>9/23/16</a:t>
             </a:fld>
             <a:endParaRPr lang="en-US" dirty="0"/>
           </a:p>
@@ -2443,7 +3276,7 @@
           <a:p>
             <a:fld id="{4509A250-FF31-4206-8172-F9D3106AACB1}" type="datetimeFigureOut">
               <a:rPr lang="en-US" dirty="0"/>
-              <a:t>9/21/16</a:t>
+              <a:t>9/23/16</a:t>
             </a:fld>
             <a:endParaRPr lang="en-US" dirty="0"/>
           </a:p>
@@ -3298,7 +4131,7 @@
           <a:p>
             <a:fld id="{4509A250-FF31-4206-8172-F9D3106AACB1}" type="datetimeFigureOut">
               <a:rPr lang="en-US" dirty="0"/>
-              <a:t>9/21/16</a:t>
+              <a:t>9/23/16</a:t>
             </a:fld>
             <a:endParaRPr lang="en-US" dirty="0"/>
           </a:p>
@@ -3463,7 +4296,7 @@
           <a:p>
             <a:fld id="{4509A250-FF31-4206-8172-F9D3106AACB1}" type="datetimeFigureOut">
               <a:rPr lang="en-US" dirty="0"/>
-              <a:t>9/21/16</a:t>
+              <a:t>9/23/16</a:t>
             </a:fld>
             <a:endParaRPr lang="en-US" dirty="0"/>
           </a:p>
@@ -3638,7 +4471,7 @@
           <a:p>
             <a:fld id="{4509A250-FF31-4206-8172-F9D3106AACB1}" type="datetimeFigureOut">
               <a:rPr lang="en-US" dirty="0"/>
-              <a:t>9/21/16</a:t>
+              <a:t>9/23/16</a:t>
             </a:fld>
             <a:endParaRPr lang="en-US" dirty="0"/>
           </a:p>
@@ -3803,7 +4636,7 @@
           <a:p>
             <a:fld id="{4509A250-FF31-4206-8172-F9D3106AACB1}" type="datetimeFigureOut">
               <a:rPr lang="en-US" dirty="0"/>
-              <a:t>9/21/16</a:t>
+              <a:t>9/23/16</a:t>
             </a:fld>
             <a:endParaRPr lang="en-US" dirty="0"/>
           </a:p>
@@ -4045,7 +4878,7 @@
           <a:p>
             <a:fld id="{9796027F-7875-4030-9381-8BD8C4F21935}" type="datetimeFigureOut">
               <a:rPr lang="en-US" dirty="0"/>
-              <a:t>9/21/16</a:t>
+              <a:t>9/23/16</a:t>
             </a:fld>
             <a:endParaRPr lang="en-US" dirty="0"/>
           </a:p>
@@ -4332,7 +5165,7 @@
           <a:p>
             <a:fld id="{9796027F-7875-4030-9381-8BD8C4F21935}" type="datetimeFigureOut">
               <a:rPr lang="en-US" dirty="0"/>
-              <a:t>9/21/16</a:t>
+              <a:t>9/23/16</a:t>
             </a:fld>
             <a:endParaRPr lang="en-US" dirty="0"/>
           </a:p>
@@ -4771,7 +5604,7 @@
           <a:p>
             <a:fld id="{9796027F-7875-4030-9381-8BD8C4F21935}" type="datetimeFigureOut">
               <a:rPr lang="en-US" dirty="0"/>
-              <a:t>9/21/16</a:t>
+              <a:t>9/23/16</a:t>
             </a:fld>
             <a:endParaRPr lang="en-US" dirty="0"/>
           </a:p>
@@ -4884,7 +5717,7 @@
           <a:p>
             <a:fld id="{4509A250-FF31-4206-8172-F9D3106AACB1}" type="datetimeFigureOut">
               <a:rPr lang="en-US" dirty="0"/>
-              <a:t>9/21/16</a:t>
+              <a:t>9/23/16</a:t>
             </a:fld>
             <a:endParaRPr lang="en-US" dirty="0"/>
           </a:p>
@@ -4974,7 +5807,7 @@
           <a:p>
             <a:fld id="{4509A250-FF31-4206-8172-F9D3106AACB1}" type="datetimeFigureOut">
               <a:rPr lang="en-US" dirty="0"/>
-              <a:t>9/21/16</a:t>
+              <a:t>9/23/16</a:t>
             </a:fld>
             <a:endParaRPr lang="en-US" dirty="0"/>
           </a:p>
@@ -5248,7 +6081,7 @@
           <a:p>
             <a:fld id="{4509A250-FF31-4206-8172-F9D3106AACB1}" type="datetimeFigureOut">
               <a:rPr lang="en-US" dirty="0"/>
-              <a:t>9/21/16</a:t>
+              <a:t>9/23/16</a:t>
             </a:fld>
             <a:endParaRPr lang="en-US" dirty="0"/>
           </a:p>
@@ -5518,7 +6351,7 @@
           <a:p>
             <a:fld id="{4509A250-FF31-4206-8172-F9D3106AACB1}" type="datetimeFigureOut">
               <a:rPr lang="en-US" dirty="0"/>
-              <a:t>9/21/16</a:t>
+              <a:t>9/23/16</a:t>
             </a:fld>
             <a:endParaRPr lang="en-US" dirty="0"/>
           </a:p>
@@ -5942,7 +6775,7 @@
           <a:p>
             <a:fld id="{4AAD347D-5ACD-4C99-B74B-A9C85AD731AF}" type="datetimeFigureOut">
               <a:rPr lang="en-US" dirty="0"/>
-              <a:t>9/21/16</a:t>
+              <a:t>9/23/16</a:t>
             </a:fld>
             <a:endParaRPr lang="en-US" dirty="0"/>
           </a:p>
@@ -6506,11 +7339,7 @@
           <a:p>
             <a:r>
               <a:rPr lang="en-US" dirty="0" smtClean="0"/>
-              <a:t>Week </a:t>
-            </a:r>
-            <a:r>
-              <a:rPr lang="en-US" dirty="0" smtClean="0"/>
-              <a:t>2</a:t>
+              <a:t>Week 2</a:t>
             </a:r>
             <a:endParaRPr lang="en-US" dirty="0"/>
           </a:p>
@@ -6520,6 +7349,235 @@
     <p:extLst>
       <p:ext uri="{BB962C8B-B14F-4D97-AF65-F5344CB8AC3E}">
         <p14:creationId xmlns:p14="http://schemas.microsoft.com/office/powerpoint/2010/main" val="116665800"/>
+      </p:ext>
+    </p:extLst>
+  </p:cSld>
+  <p:clrMapOvr>
+    <a:masterClrMapping/>
+  </p:clrMapOvr>
+</p:sld>
+</file>
+
+<file path=ppt/slides/slide10.xml><?xml version="1.0" encoding="utf-8"?>
+<p:sld xmlns:a="http://schemas.openxmlformats.org/drawingml/2006/main" xmlns:r="http://schemas.openxmlformats.org/officeDocument/2006/relationships" xmlns:p="http://schemas.openxmlformats.org/presentationml/2006/main">
+  <p:cSld>
+    <p:spTree>
+      <p:nvGrpSpPr>
+        <p:cNvPr id="1" name=""/>
+        <p:cNvGrpSpPr/>
+        <p:nvPr/>
+      </p:nvGrpSpPr>
+      <p:grpSpPr>
+        <a:xfrm>
+          <a:off x="0" y="0"/>
+          <a:ext cx="0" cy="0"/>
+          <a:chOff x="0" y="0"/>
+          <a:chExt cx="0" cy="0"/>
+        </a:xfrm>
+      </p:grpSpPr>
+      <p:sp>
+        <p:nvSpPr>
+          <p:cNvPr id="2" name="Title 1"/>
+          <p:cNvSpPr>
+            <a:spLocks noGrp="1"/>
+          </p:cNvSpPr>
+          <p:nvPr>
+            <p:ph type="title"/>
+          </p:nvPr>
+        </p:nvSpPr>
+        <p:spPr/>
+        <p:txBody>
+          <a:bodyPr/>
+          <a:lstStyle/>
+          <a:p>
+            <a:r>
+              <a:rPr lang="en-US" dirty="0" smtClean="0"/>
+              <a:t>Permission Sets</a:t>
+            </a:r>
+            <a:endParaRPr lang="en-US" dirty="0"/>
+          </a:p>
+        </p:txBody>
+      </p:sp>
+      <p:sp>
+        <p:nvSpPr>
+          <p:cNvPr id="3" name="Content Placeholder 2"/>
+          <p:cNvSpPr>
+            <a:spLocks noGrp="1"/>
+          </p:cNvSpPr>
+          <p:nvPr>
+            <p:ph idx="1"/>
+          </p:nvPr>
+        </p:nvSpPr>
+        <p:spPr/>
+        <p:txBody>
+          <a:bodyPr/>
+          <a:lstStyle/>
+          <a:p>
+            <a:r>
+              <a:rPr lang="en-US" dirty="0" smtClean="0"/>
+              <a:t>Extends profiles</a:t>
+            </a:r>
+          </a:p>
+          <a:p>
+            <a:r>
+              <a:rPr lang="en-US" dirty="0" smtClean="0"/>
+              <a:t>Special cases</a:t>
+            </a:r>
+          </a:p>
+        </p:txBody>
+      </p:sp>
+    </p:spTree>
+    <p:extLst>
+      <p:ext uri="{BB962C8B-B14F-4D97-AF65-F5344CB8AC3E}">
+        <p14:creationId xmlns:p14="http://schemas.microsoft.com/office/powerpoint/2010/main" val="696765827"/>
+      </p:ext>
+    </p:extLst>
+  </p:cSld>
+  <p:clrMapOvr>
+    <a:masterClrMapping/>
+  </p:clrMapOvr>
+</p:sld>
+</file>
+
+<file path=ppt/slides/slide11.xml><?xml version="1.0" encoding="utf-8"?>
+<p:sld xmlns:a="http://schemas.openxmlformats.org/drawingml/2006/main" xmlns:r="http://schemas.openxmlformats.org/officeDocument/2006/relationships" xmlns:p="http://schemas.openxmlformats.org/presentationml/2006/main">
+  <p:cSld>
+    <p:spTree>
+      <p:nvGrpSpPr>
+        <p:cNvPr id="1" name=""/>
+        <p:cNvGrpSpPr/>
+        <p:nvPr/>
+      </p:nvGrpSpPr>
+      <p:grpSpPr>
+        <a:xfrm>
+          <a:off x="0" y="0"/>
+          <a:ext cx="0" cy="0"/>
+          <a:chOff x="0" y="0"/>
+          <a:chExt cx="0" cy="0"/>
+        </a:xfrm>
+      </p:grpSpPr>
+      <p:sp>
+        <p:nvSpPr>
+          <p:cNvPr id="2" name="Title 1"/>
+          <p:cNvSpPr>
+            <a:spLocks noGrp="1"/>
+          </p:cNvSpPr>
+          <p:nvPr>
+            <p:ph type="title"/>
+          </p:nvPr>
+        </p:nvSpPr>
+        <p:spPr/>
+        <p:txBody>
+          <a:bodyPr/>
+          <a:lstStyle/>
+          <a:p>
+            <a:r>
+              <a:rPr lang="en-US" dirty="0" smtClean="0"/>
+              <a:t>Other Security</a:t>
+            </a:r>
+            <a:endParaRPr lang="en-US" dirty="0"/>
+          </a:p>
+        </p:txBody>
+      </p:sp>
+      <p:sp>
+        <p:nvSpPr>
+          <p:cNvPr id="3" name="Content Placeholder 2"/>
+          <p:cNvSpPr>
+            <a:spLocks noGrp="1"/>
+          </p:cNvSpPr>
+          <p:nvPr>
+            <p:ph idx="1"/>
+          </p:nvPr>
+        </p:nvSpPr>
+        <p:spPr/>
+        <p:txBody>
+          <a:bodyPr/>
+          <a:lstStyle/>
+          <a:p>
+            <a:r>
+              <a:rPr lang="en-US" dirty="0" smtClean="0"/>
+              <a:t>Field Level Security</a:t>
+            </a:r>
+            <a:endParaRPr lang="en-US" dirty="0"/>
+          </a:p>
+        </p:txBody>
+      </p:sp>
+    </p:spTree>
+    <p:extLst>
+      <p:ext uri="{BB962C8B-B14F-4D97-AF65-F5344CB8AC3E}">
+        <p14:creationId xmlns:p14="http://schemas.microsoft.com/office/powerpoint/2010/main" val="124445898"/>
+      </p:ext>
+    </p:extLst>
+  </p:cSld>
+  <p:clrMapOvr>
+    <a:masterClrMapping/>
+  </p:clrMapOvr>
+</p:sld>
+</file>
+
+<file path=ppt/slides/slide12.xml><?xml version="1.0" encoding="utf-8"?>
+<p:sld xmlns:a="http://schemas.openxmlformats.org/drawingml/2006/main" xmlns:r="http://schemas.openxmlformats.org/officeDocument/2006/relationships" xmlns:p="http://schemas.openxmlformats.org/presentationml/2006/main">
+  <p:cSld>
+    <p:spTree>
+      <p:nvGrpSpPr>
+        <p:cNvPr id="1" name=""/>
+        <p:cNvGrpSpPr/>
+        <p:nvPr/>
+      </p:nvGrpSpPr>
+      <p:grpSpPr>
+        <a:xfrm>
+          <a:off x="0" y="0"/>
+          <a:ext cx="0" cy="0"/>
+          <a:chOff x="0" y="0"/>
+          <a:chExt cx="0" cy="0"/>
+        </a:xfrm>
+      </p:grpSpPr>
+      <p:sp>
+        <p:nvSpPr>
+          <p:cNvPr id="2" name="Title 1"/>
+          <p:cNvSpPr>
+            <a:spLocks noGrp="1"/>
+          </p:cNvSpPr>
+          <p:nvPr>
+            <p:ph type="title"/>
+          </p:nvPr>
+        </p:nvSpPr>
+        <p:spPr/>
+        <p:txBody>
+          <a:bodyPr/>
+          <a:lstStyle/>
+          <a:p>
+            <a:r>
+              <a:rPr lang="en-US" smtClean="0"/>
+              <a:t>Homework</a:t>
+            </a:r>
+            <a:endParaRPr lang="en-US" dirty="0"/>
+          </a:p>
+        </p:txBody>
+      </p:sp>
+      <p:sp>
+        <p:nvSpPr>
+          <p:cNvPr id="3" name="Content Placeholder 2"/>
+          <p:cNvSpPr>
+            <a:spLocks noGrp="1"/>
+          </p:cNvSpPr>
+          <p:nvPr>
+            <p:ph idx="1"/>
+          </p:nvPr>
+        </p:nvSpPr>
+        <p:spPr/>
+        <p:txBody>
+          <a:bodyPr/>
+          <a:lstStyle/>
+          <a:p>
+            <a:endParaRPr lang="en-US"/>
+          </a:p>
+        </p:txBody>
+      </p:sp>
+    </p:spTree>
+    <p:extLst>
+      <p:ext uri="{BB962C8B-B14F-4D97-AF65-F5344CB8AC3E}">
+        <p14:creationId xmlns:p14="http://schemas.microsoft.com/office/powerpoint/2010/main" val="1984153347"/>
       </p:ext>
     </p:extLst>
   </p:cSld>
@@ -6606,7 +7664,6 @@
               <a:rPr lang="en-US" dirty="0" smtClean="0"/>
               <a:t>Thoughts on Lightning?</a:t>
             </a:r>
-            <a:endParaRPr lang="en-US" dirty="0" smtClean="0"/>
           </a:p>
         </p:txBody>
       </p:sp>
@@ -6745,15 +7802,15 @@
           <a:p>
             <a:r>
               <a:rPr lang="en-US" dirty="0" smtClean="0"/>
-              <a:t>Profiles</a:t>
-            </a:r>
-            <a:endParaRPr lang="en-US" dirty="0"/>
-          </a:p>
-        </p:txBody>
-      </p:sp>
-      <p:sp>
-        <p:nvSpPr>
-          <p:cNvPr id="5" name="Content Placeholder 4"/>
+              <a:t>Security</a:t>
+            </a:r>
+            <a:endParaRPr lang="en-US" dirty="0"/>
+          </a:p>
+        </p:txBody>
+      </p:sp>
+      <p:sp>
+        <p:nvSpPr>
+          <p:cNvPr id="3" name="Content Placeholder 2"/>
           <p:cNvSpPr>
             <a:spLocks noGrp="1"/>
           </p:cNvSpPr>
@@ -6766,67 +7823,35 @@
           <a:bodyPr/>
           <a:lstStyle/>
           <a:p>
-            <a:pPr algn="just"/>
             <a:r>
               <a:rPr lang="en-US" dirty="0" smtClean="0"/>
-              <a:t>What you can do</a:t>
-            </a:r>
-          </a:p>
-          <a:p>
-            <a:pPr algn="just"/>
+              <a:t>IP Ranges</a:t>
+            </a:r>
+          </a:p>
+          <a:p>
             <a:r>
               <a:rPr lang="en-US" dirty="0" smtClean="0"/>
-              <a:t>Different based on needs</a:t>
-            </a:r>
-          </a:p>
-          <a:p>
-            <a:pPr algn="just"/>
+              <a:t>Login Hours</a:t>
+            </a:r>
+          </a:p>
+          <a:p>
             <a:r>
               <a:rPr lang="en-US" dirty="0" smtClean="0"/>
-              <a:t>Read Only</a:t>
-            </a:r>
-          </a:p>
-          <a:p>
-            <a:pPr algn="just"/>
-            <a:r>
-              <a:rPr lang="en-US" dirty="0" smtClean="0"/>
-              <a:t>API</a:t>
-            </a:r>
-          </a:p>
-          <a:p>
-            <a:pPr algn="just"/>
-            <a:r>
-              <a:rPr lang="en-US" dirty="0" smtClean="0"/>
-              <a:t>System Admin</a:t>
-            </a:r>
-          </a:p>
-          <a:p>
-            <a:pPr algn="just"/>
-            <a:endParaRPr lang="en-US" dirty="0" smtClean="0"/>
-          </a:p>
-          <a:p>
-            <a:pPr algn="just"/>
-            <a:endParaRPr lang="en-US" dirty="0"/>
+              <a:t>Lockout Period</a:t>
+            </a:r>
           </a:p>
         </p:txBody>
       </p:sp>
     </p:spTree>
     <p:extLst>
       <p:ext uri="{BB962C8B-B14F-4D97-AF65-F5344CB8AC3E}">
-        <p14:creationId xmlns:p14="http://schemas.microsoft.com/office/powerpoint/2010/main" val="1024418136"/>
+        <p14:creationId xmlns:p14="http://schemas.microsoft.com/office/powerpoint/2010/main" val="261497960"/>
       </p:ext>
     </p:extLst>
   </p:cSld>
   <p:clrMapOvr>
     <a:masterClrMapping/>
   </p:clrMapOvr>
-  <p:timing>
-    <p:tnLst>
-      <p:par>
-        <p:cTn id="1" dur="indefinite" restart="never" nodeType="tmRoot"/>
-      </p:par>
-    </p:tnLst>
-  </p:timing>
 </p:sld>
 </file>
 
@@ -6864,7 +7889,7 @@
           <a:p>
             <a:r>
               <a:rPr lang="en-US" dirty="0" smtClean="0"/>
-              <a:t>Security</a:t>
+              <a:t>All the Stuffs</a:t>
             </a:r>
             <a:endParaRPr lang="en-US" dirty="0"/>
           </a:p>
@@ -6887,27 +7912,51 @@
           <a:p>
             <a:r>
               <a:rPr lang="en-US" dirty="0" smtClean="0"/>
-              <a:t>IP Ranges</a:t>
+              <a:t>OWD – Org Wide Defaults</a:t>
             </a:r>
           </a:p>
           <a:p>
             <a:r>
               <a:rPr lang="en-US" dirty="0" smtClean="0"/>
-              <a:t>Login Hours</a:t>
+              <a:t>Manual Sharing – Access at a record level.</a:t>
             </a:r>
           </a:p>
           <a:p>
             <a:r>
               <a:rPr lang="en-US" dirty="0" smtClean="0"/>
-              <a:t>Lockout Period</a:t>
-            </a:r>
+              <a:t>Sharing Rules – Organizational record visibility</a:t>
+            </a:r>
+          </a:p>
+          <a:p>
+            <a:r>
+              <a:rPr lang="en-US" dirty="0" smtClean="0"/>
+              <a:t>Roles – Which records you can see</a:t>
+            </a:r>
+          </a:p>
+          <a:p>
+            <a:r>
+              <a:rPr lang="en-US" dirty="0" smtClean="0"/>
+              <a:t>Profiles – What you can do with the records you can see</a:t>
+            </a:r>
+          </a:p>
+          <a:p>
+            <a:r>
+              <a:rPr lang="en-US" dirty="0" smtClean="0"/>
+              <a:t>Permission Sets – Extension of profile</a:t>
+            </a:r>
+          </a:p>
+          <a:p>
+            <a:endParaRPr lang="en-US" dirty="0" smtClean="0"/>
+          </a:p>
+          <a:p>
+            <a:endParaRPr lang="en-US" dirty="0"/>
           </a:p>
         </p:txBody>
       </p:sp>
     </p:spTree>
     <p:extLst>
       <p:ext uri="{BB962C8B-B14F-4D97-AF65-F5344CB8AC3E}">
-        <p14:creationId xmlns:p14="http://schemas.microsoft.com/office/powerpoint/2010/main" val="261497960"/>
+        <p14:creationId xmlns:p14="http://schemas.microsoft.com/office/powerpoint/2010/main" val="177991056"/>
       </p:ext>
     </p:extLst>
   </p:cSld>
@@ -6951,7 +8000,7 @@
           <a:p>
             <a:r>
               <a:rPr lang="en-US" dirty="0" smtClean="0"/>
-              <a:t>Roles Hierarchy</a:t>
+              <a:t>OWD</a:t>
             </a:r>
             <a:endParaRPr lang="en-US" dirty="0"/>
           </a:p>
@@ -6974,26 +8023,16 @@
           <a:p>
             <a:r>
               <a:rPr lang="en-US" dirty="0" smtClean="0"/>
-              <a:t>Controls what you can see on a record level</a:t>
-            </a:r>
-          </a:p>
-          <a:p>
+              <a:t>Controls </a:t>
+            </a:r>
+            <a:r>
+              <a:rPr lang="en-US" b="1" dirty="0" smtClean="0"/>
+              <a:t>visibility </a:t>
+            </a:r>
             <a:r>
               <a:rPr lang="en-US" dirty="0" smtClean="0"/>
-              <a:t>Who can see your records?</a:t>
-            </a:r>
-          </a:p>
-          <a:p>
-            <a:r>
-              <a:rPr lang="en-US" dirty="0" smtClean="0"/>
-              <a:t>Can be overwritten at the </a:t>
-            </a:r>
-            <a:r>
-              <a:rPr lang="en-US" smtClean="0"/>
-              <a:t>Org Wide Default level.</a:t>
-            </a:r>
-          </a:p>
-          <a:p>
+              <a:t>to objects at an organizational level.</a:t>
+            </a:r>
             <a:endParaRPr lang="en-US" dirty="0"/>
           </a:p>
         </p:txBody>
@@ -7001,7 +8040,7 @@
     </p:spTree>
     <p:extLst>
       <p:ext uri="{BB962C8B-B14F-4D97-AF65-F5344CB8AC3E}">
-        <p14:creationId xmlns:p14="http://schemas.microsoft.com/office/powerpoint/2010/main" val="1608185931"/>
+        <p14:creationId xmlns:p14="http://schemas.microsoft.com/office/powerpoint/2010/main" val="457365363"/>
       </p:ext>
     </p:extLst>
   </p:cSld>
@@ -7068,8 +8107,35 @@
           <a:p>
             <a:r>
               <a:rPr lang="en-US" dirty="0" smtClean="0"/>
-              <a:t>Controls what can you see from an object level</a:t>
-            </a:r>
+              <a:t>Controls what can you </a:t>
+            </a:r>
+            <a:r>
+              <a:rPr lang="en-US" b="1" dirty="0" smtClean="0"/>
+              <a:t>see</a:t>
+            </a:r>
+            <a:r>
+              <a:rPr lang="en-US" dirty="0" smtClean="0"/>
+              <a:t> from an object </a:t>
+            </a:r>
+            <a:r>
+              <a:rPr lang="en-US" dirty="0" smtClean="0"/>
+              <a:t>level</a:t>
+            </a:r>
+          </a:p>
+          <a:p>
+            <a:r>
+              <a:rPr lang="en-US" dirty="0" smtClean="0"/>
+              <a:t>Shared with roles, subordinates, and groups</a:t>
+            </a:r>
+          </a:p>
+          <a:p>
+            <a:r>
+              <a:rPr lang="en-US" dirty="0" smtClean="0"/>
+              <a:t>Manual sharing, individual record level.</a:t>
+            </a:r>
+          </a:p>
+          <a:p>
+            <a:endParaRPr lang="en-US" dirty="0" smtClean="0"/>
           </a:p>
           <a:p>
             <a:endParaRPr lang="en-US" dirty="0"/>
@@ -7123,7 +8189,7 @@
           <a:p>
             <a:r>
               <a:rPr lang="en-US" dirty="0" smtClean="0"/>
-              <a:t>Other Security</a:t>
+              <a:t>Roles Hierarchy</a:t>
             </a:r>
             <a:endParaRPr lang="en-US" dirty="0"/>
           </a:p>
@@ -7146,8 +8212,30 @@
           <a:p>
             <a:r>
               <a:rPr lang="en-US" dirty="0" smtClean="0"/>
-              <a:t>Field Level Security</a:t>
-            </a:r>
+              <a:t>Controls what you can </a:t>
+            </a:r>
+            <a:r>
+              <a:rPr lang="en-US" b="1" dirty="0" smtClean="0"/>
+              <a:t>see</a:t>
+            </a:r>
+            <a:r>
+              <a:rPr lang="en-US" dirty="0" smtClean="0"/>
+              <a:t> on a record level</a:t>
+            </a:r>
+          </a:p>
+          <a:p>
+            <a:r>
+              <a:rPr lang="en-US" dirty="0" smtClean="0"/>
+              <a:t>Who can see your records?</a:t>
+            </a:r>
+          </a:p>
+          <a:p>
+            <a:r>
+              <a:rPr lang="en-US" dirty="0" smtClean="0"/>
+              <a:t>Can be overwritten at the Org Wide Default level.</a:t>
+            </a:r>
+          </a:p>
+          <a:p>
             <a:endParaRPr lang="en-US" dirty="0"/>
           </a:p>
         </p:txBody>
@@ -7155,13 +8243,135 @@
     </p:spTree>
     <p:extLst>
       <p:ext uri="{BB962C8B-B14F-4D97-AF65-F5344CB8AC3E}">
-        <p14:creationId xmlns:p14="http://schemas.microsoft.com/office/powerpoint/2010/main" val="124445898"/>
+        <p14:creationId xmlns:p14="http://schemas.microsoft.com/office/powerpoint/2010/main" val="1608185931"/>
       </p:ext>
     </p:extLst>
   </p:cSld>
   <p:clrMapOvr>
     <a:masterClrMapping/>
   </p:clrMapOvr>
+</p:sld>
+</file>
+
+<file path=ppt/slides/slide9.xml><?xml version="1.0" encoding="utf-8"?>
+<p:sld xmlns:a="http://schemas.openxmlformats.org/drawingml/2006/main" xmlns:r="http://schemas.openxmlformats.org/officeDocument/2006/relationships" xmlns:p="http://schemas.openxmlformats.org/presentationml/2006/main">
+  <p:cSld>
+    <p:spTree>
+      <p:nvGrpSpPr>
+        <p:cNvPr id="1" name=""/>
+        <p:cNvGrpSpPr/>
+        <p:nvPr/>
+      </p:nvGrpSpPr>
+      <p:grpSpPr>
+        <a:xfrm>
+          <a:off x="0" y="0"/>
+          <a:ext cx="0" cy="0"/>
+          <a:chOff x="0" y="0"/>
+          <a:chExt cx="0" cy="0"/>
+        </a:xfrm>
+      </p:grpSpPr>
+      <p:sp>
+        <p:nvSpPr>
+          <p:cNvPr id="2" name="Title 1"/>
+          <p:cNvSpPr>
+            <a:spLocks noGrp="1"/>
+          </p:cNvSpPr>
+          <p:nvPr>
+            <p:ph type="title"/>
+          </p:nvPr>
+        </p:nvSpPr>
+        <p:spPr/>
+        <p:txBody>
+          <a:bodyPr/>
+          <a:lstStyle/>
+          <a:p>
+            <a:r>
+              <a:rPr lang="en-US" dirty="0" smtClean="0"/>
+              <a:t>Profiles</a:t>
+            </a:r>
+            <a:endParaRPr lang="en-US" dirty="0"/>
+          </a:p>
+        </p:txBody>
+      </p:sp>
+      <p:sp>
+        <p:nvSpPr>
+          <p:cNvPr id="5" name="Content Placeholder 4"/>
+          <p:cNvSpPr>
+            <a:spLocks noGrp="1"/>
+          </p:cNvSpPr>
+          <p:nvPr>
+            <p:ph idx="1"/>
+          </p:nvPr>
+        </p:nvSpPr>
+        <p:spPr/>
+        <p:txBody>
+          <a:bodyPr/>
+          <a:lstStyle/>
+          <a:p>
+            <a:pPr algn="just"/>
+            <a:r>
+              <a:rPr lang="en-US" dirty="0" smtClean="0"/>
+              <a:t>What you can </a:t>
+            </a:r>
+            <a:r>
+              <a:rPr lang="en-US" b="1" dirty="0" smtClean="0"/>
+              <a:t>do </a:t>
+            </a:r>
+            <a:r>
+              <a:rPr lang="en-US" dirty="0" smtClean="0"/>
+              <a:t>(CRUD)</a:t>
+            </a:r>
+            <a:endParaRPr lang="en-US" b="1" dirty="0" smtClean="0"/>
+          </a:p>
+          <a:p>
+            <a:pPr algn="just"/>
+            <a:r>
+              <a:rPr lang="en-US" dirty="0" smtClean="0"/>
+              <a:t>Different based on needs</a:t>
+            </a:r>
+          </a:p>
+          <a:p>
+            <a:pPr algn="just"/>
+            <a:r>
+              <a:rPr lang="en-US" dirty="0" smtClean="0"/>
+              <a:t>Standard profiles (Read Only, API Only, System Admin)</a:t>
+            </a:r>
+          </a:p>
+          <a:p>
+            <a:pPr algn="just"/>
+            <a:r>
+              <a:rPr lang="en-US" dirty="0" smtClean="0"/>
+              <a:t>Custom profiles</a:t>
+            </a:r>
+            <a:endParaRPr lang="en-US" dirty="0" smtClean="0"/>
+          </a:p>
+          <a:p>
+            <a:pPr algn="just"/>
+            <a:endParaRPr lang="en-US" dirty="0" smtClean="0"/>
+          </a:p>
+          <a:p>
+            <a:pPr algn="just"/>
+            <a:endParaRPr lang="en-US" dirty="0"/>
+          </a:p>
+        </p:txBody>
+      </p:sp>
+    </p:spTree>
+    <p:extLst>
+      <p:ext uri="{BB962C8B-B14F-4D97-AF65-F5344CB8AC3E}">
+        <p14:creationId xmlns:p14="http://schemas.microsoft.com/office/powerpoint/2010/main" val="1024418136"/>
+      </p:ext>
+    </p:extLst>
+  </p:cSld>
+  <p:clrMapOvr>
+    <a:masterClrMapping/>
+  </p:clrMapOvr>
+  <p:timing>
+    <p:tnLst>
+      <p:par>
+        <p:cTn id="1" dur="indefinite" restart="never" nodeType="tmRoot"/>
+      </p:par>
+    </p:tnLst>
+  </p:timing>
 </p:sld>
 </file>
 

</xml_diff>